<commit_message>
trial2patient modified to cover sclc
</commit_message>
<xml_diff>
--- a/scripts/trial2patient.pptx
+++ b/scripts/trial2patient.pptx
@@ -7,6 +7,7 @@
   <p:sldIdLst>
     <p:sldId id="256" r:id="rId2"/>
     <p:sldId id="257" r:id="rId3"/>
+    <p:sldId id="258" r:id="rId4"/>
   </p:sldIdLst>
   <p:sldSz cx="12192000" cy="6858000"/>
   <p:notesSz cx="6858000" cy="9144000"/>
@@ -105,6 +106,11 @@
       </a:defRPr>
     </a:lvl9pPr>
   </p:defaultTextStyle>
+  <p:extLst>
+    <p:ext uri="{EFAFB233-063F-42B5-8137-9DF3F51BA10A}">
+      <p15:sldGuideLst xmlns:p15="http://schemas.microsoft.com/office/powerpoint/2012/main"/>
+    </p:ext>
+  </p:extLst>
 </p:presentation>
 </file>
 
@@ -255,7 +261,7 @@
           <a:p>
             <a:fld id="{49300373-1AFF-C74E-B781-55A15AEBEFE5}" type="datetimeFigureOut">
               <a:rPr lang="en-US" smtClean="0"/>
-              <a:t>1/14/20</a:t>
+              <a:t>1/15/20</a:t>
             </a:fld>
             <a:endParaRPr lang="en-US"/>
           </a:p>
@@ -453,7 +459,7 @@
           <a:p>
             <a:fld id="{49300373-1AFF-C74E-B781-55A15AEBEFE5}" type="datetimeFigureOut">
               <a:rPr lang="en-US" smtClean="0"/>
-              <a:t>1/14/20</a:t>
+              <a:t>1/15/20</a:t>
             </a:fld>
             <a:endParaRPr lang="en-US"/>
           </a:p>
@@ -661,7 +667,7 @@
           <a:p>
             <a:fld id="{49300373-1AFF-C74E-B781-55A15AEBEFE5}" type="datetimeFigureOut">
               <a:rPr lang="en-US" smtClean="0"/>
-              <a:t>1/14/20</a:t>
+              <a:t>1/15/20</a:t>
             </a:fld>
             <a:endParaRPr lang="en-US"/>
           </a:p>
@@ -859,7 +865,7 @@
           <a:p>
             <a:fld id="{49300373-1AFF-C74E-B781-55A15AEBEFE5}" type="datetimeFigureOut">
               <a:rPr lang="en-US" smtClean="0"/>
-              <a:t>1/14/20</a:t>
+              <a:t>1/15/20</a:t>
             </a:fld>
             <a:endParaRPr lang="en-US"/>
           </a:p>
@@ -1134,7 +1140,7 @@
           <a:p>
             <a:fld id="{49300373-1AFF-C74E-B781-55A15AEBEFE5}" type="datetimeFigureOut">
               <a:rPr lang="en-US" smtClean="0"/>
-              <a:t>1/14/20</a:t>
+              <a:t>1/15/20</a:t>
             </a:fld>
             <a:endParaRPr lang="en-US"/>
           </a:p>
@@ -1399,7 +1405,7 @@
           <a:p>
             <a:fld id="{49300373-1AFF-C74E-B781-55A15AEBEFE5}" type="datetimeFigureOut">
               <a:rPr lang="en-US" smtClean="0"/>
-              <a:t>1/14/20</a:t>
+              <a:t>1/15/20</a:t>
             </a:fld>
             <a:endParaRPr lang="en-US"/>
           </a:p>
@@ -1811,7 +1817,7 @@
           <a:p>
             <a:fld id="{49300373-1AFF-C74E-B781-55A15AEBEFE5}" type="datetimeFigureOut">
               <a:rPr lang="en-US" smtClean="0"/>
-              <a:t>1/14/20</a:t>
+              <a:t>1/15/20</a:t>
             </a:fld>
             <a:endParaRPr lang="en-US"/>
           </a:p>
@@ -1952,7 +1958,7 @@
           <a:p>
             <a:fld id="{49300373-1AFF-C74E-B781-55A15AEBEFE5}" type="datetimeFigureOut">
               <a:rPr lang="en-US" smtClean="0"/>
-              <a:t>1/14/20</a:t>
+              <a:t>1/15/20</a:t>
             </a:fld>
             <a:endParaRPr lang="en-US"/>
           </a:p>
@@ -2065,7 +2071,7 @@
           <a:p>
             <a:fld id="{49300373-1AFF-C74E-B781-55A15AEBEFE5}" type="datetimeFigureOut">
               <a:rPr lang="en-US" smtClean="0"/>
-              <a:t>1/14/20</a:t>
+              <a:t>1/15/20</a:t>
             </a:fld>
             <a:endParaRPr lang="en-US"/>
           </a:p>
@@ -2376,7 +2382,7 @@
           <a:p>
             <a:fld id="{49300373-1AFF-C74E-B781-55A15AEBEFE5}" type="datetimeFigureOut">
               <a:rPr lang="en-US" smtClean="0"/>
-              <a:t>1/14/20</a:t>
+              <a:t>1/15/20</a:t>
             </a:fld>
             <a:endParaRPr lang="en-US"/>
           </a:p>
@@ -2664,7 +2670,7 @@
           <a:p>
             <a:fld id="{49300373-1AFF-C74E-B781-55A15AEBEFE5}" type="datetimeFigureOut">
               <a:rPr lang="en-US" smtClean="0"/>
-              <a:t>1/14/20</a:t>
+              <a:t>1/15/20</a:t>
             </a:fld>
             <a:endParaRPr lang="en-US"/>
           </a:p>
@@ -2905,7 +2911,7 @@
           <a:p>
             <a:fld id="{49300373-1AFF-C74E-B781-55A15AEBEFE5}" type="datetimeFigureOut">
               <a:rPr lang="en-US" smtClean="0"/>
-              <a:t>1/14/20</a:t>
+              <a:t>1/15/20</a:t>
             </a:fld>
             <a:endParaRPr lang="en-US"/>
           </a:p>
@@ -4754,6 +4760,1480 @@
 </p:sld>
 </file>
 
+<file path=ppt/slides/slide3.xml><?xml version="1.0" encoding="utf-8"?>
+<p:sld xmlns:a="http://schemas.openxmlformats.org/drawingml/2006/main" xmlns:r="http://schemas.openxmlformats.org/officeDocument/2006/relationships" xmlns:p="http://schemas.openxmlformats.org/presentationml/2006/main">
+  <p:cSld>
+    <p:spTree>
+      <p:nvGrpSpPr>
+        <p:cNvPr id="1" name=""/>
+        <p:cNvGrpSpPr/>
+        <p:nvPr/>
+      </p:nvGrpSpPr>
+      <p:grpSpPr>
+        <a:xfrm>
+          <a:off x="0" y="0"/>
+          <a:ext cx="0" cy="0"/>
+          <a:chOff x="0" y="0"/>
+          <a:chExt cx="0" cy="0"/>
+        </a:xfrm>
+      </p:grpSpPr>
+      <p:sp>
+        <p:nvSpPr>
+          <p:cNvPr id="2" name="Title 1">
+            <a:extLst>
+              <a:ext uri="{FF2B5EF4-FFF2-40B4-BE49-F238E27FC236}">
+                <a16:creationId xmlns:a16="http://schemas.microsoft.com/office/drawing/2014/main" id="{85FC4D63-AE49-D543-86F5-9C52584B547B}"/>
+              </a:ext>
+            </a:extLst>
+          </p:cNvPr>
+          <p:cNvSpPr>
+            <a:spLocks noGrp="1"/>
+          </p:cNvSpPr>
+          <p:nvPr>
+            <p:ph type="title"/>
+          </p:nvPr>
+        </p:nvSpPr>
+        <p:spPr/>
+        <p:txBody>
+          <a:bodyPr/>
+          <a:lstStyle/>
+          <a:p>
+            <a:r>
+              <a:rPr lang="en-US" dirty="0" err="1"/>
+              <a:t>Rimsdw</a:t>
+            </a:r>
+            <a:r>
+              <a:rPr lang="en-US" dirty="0"/>
+              <a:t>:: </a:t>
+            </a:r>
+            <a:r>
+              <a:rPr lang="en-US" dirty="0" err="1"/>
+              <a:t>ct_sclc</a:t>
+            </a:r>
+            <a:endParaRPr lang="en-US" dirty="0"/>
+          </a:p>
+        </p:txBody>
+      </p:sp>
+      <p:sp>
+        <p:nvSpPr>
+          <p:cNvPr id="3" name="Content Placeholder 2">
+            <a:extLst>
+              <a:ext uri="{FF2B5EF4-FFF2-40B4-BE49-F238E27FC236}">
+                <a16:creationId xmlns:a16="http://schemas.microsoft.com/office/drawing/2014/main" id="{4F69CB21-B502-A148-A726-352CA925F640}"/>
+              </a:ext>
+            </a:extLst>
+          </p:cNvPr>
+          <p:cNvSpPr>
+            <a:spLocks noGrp="1"/>
+          </p:cNvSpPr>
+          <p:nvPr>
+            <p:ph idx="1"/>
+          </p:nvPr>
+        </p:nvSpPr>
+        <p:spPr/>
+        <p:txBody>
+          <a:bodyPr/>
+          <a:lstStyle/>
+          <a:p>
+            <a:endParaRPr lang="en-US" dirty="0"/>
+          </a:p>
+        </p:txBody>
+      </p:sp>
+      <p:sp>
+        <p:nvSpPr>
+          <p:cNvPr id="4" name="Rectangle 3">
+            <a:extLst>
+              <a:ext uri="{FF2B5EF4-FFF2-40B4-BE49-F238E27FC236}">
+                <a16:creationId xmlns:a16="http://schemas.microsoft.com/office/drawing/2014/main" id="{591CEBA8-C096-CB4E-A01A-B89C1F55B688}"/>
+              </a:ext>
+            </a:extLst>
+          </p:cNvPr>
+          <p:cNvSpPr/>
+          <p:nvPr/>
+        </p:nvSpPr>
+        <p:spPr>
+          <a:xfrm>
+            <a:off x="2059807" y="1207594"/>
+            <a:ext cx="1996965" cy="515007"/>
+          </a:xfrm>
+          <a:prstGeom prst="rect">
+            <a:avLst/>
+          </a:prstGeom>
+        </p:spPr>
+        <p:style>
+          <a:lnRef idx="2">
+            <a:schemeClr val="accent1">
+              <a:shade val="50000"/>
+            </a:schemeClr>
+          </a:lnRef>
+          <a:fillRef idx="1">
+            <a:schemeClr val="accent1"/>
+          </a:fillRef>
+          <a:effectRef idx="0">
+            <a:schemeClr val="accent1"/>
+          </a:effectRef>
+          <a:fontRef idx="minor">
+            <a:schemeClr val="lt1"/>
+          </a:fontRef>
+        </p:style>
+        <p:txBody>
+          <a:bodyPr rtlCol="0" anchor="ctr"/>
+          <a:lstStyle/>
+          <a:p>
+            <a:pPr algn="ctr"/>
+            <a:r>
+              <a:rPr lang="en-US" dirty="0" err="1"/>
+              <a:t>Crit_attr_raw</a:t>
+            </a:r>
+            <a:endParaRPr lang="en-US" dirty="0"/>
+          </a:p>
+        </p:txBody>
+      </p:sp>
+      <p:sp>
+        <p:nvSpPr>
+          <p:cNvPr id="5" name="Rectangle 4">
+            <a:extLst>
+              <a:ext uri="{FF2B5EF4-FFF2-40B4-BE49-F238E27FC236}">
+                <a16:creationId xmlns:a16="http://schemas.microsoft.com/office/drawing/2014/main" id="{59EAD8DB-5764-A747-9AF1-2C01AA73E7E9}"/>
+              </a:ext>
+            </a:extLst>
+          </p:cNvPr>
+          <p:cNvSpPr/>
+          <p:nvPr/>
+        </p:nvSpPr>
+        <p:spPr>
+          <a:xfrm>
+            <a:off x="5993308" y="158500"/>
+            <a:ext cx="1996965" cy="515007"/>
+          </a:xfrm>
+          <a:prstGeom prst="rect">
+            <a:avLst/>
+          </a:prstGeom>
+        </p:spPr>
+        <p:style>
+          <a:lnRef idx="2">
+            <a:schemeClr val="accent1">
+              <a:shade val="50000"/>
+            </a:schemeClr>
+          </a:lnRef>
+          <a:fillRef idx="1">
+            <a:schemeClr val="accent1"/>
+          </a:fillRef>
+          <a:effectRef idx="0">
+            <a:schemeClr val="accent1"/>
+          </a:effectRef>
+          <a:fontRef idx="minor">
+            <a:schemeClr val="lt1"/>
+          </a:fontRef>
+        </p:style>
+        <p:txBody>
+          <a:bodyPr rtlCol="0" anchor="ctr"/>
+          <a:lstStyle/>
+          <a:p>
+            <a:pPr algn="ctr"/>
+            <a:r>
+              <a:rPr lang="en-US" dirty="0" err="1"/>
+              <a:t>trial_attr_raw</a:t>
+            </a:r>
+            <a:endParaRPr lang="en-US" dirty="0"/>
+          </a:p>
+        </p:txBody>
+      </p:sp>
+      <p:sp>
+        <p:nvSpPr>
+          <p:cNvPr id="6" name="Rectangle 5">
+            <a:extLst>
+              <a:ext uri="{FF2B5EF4-FFF2-40B4-BE49-F238E27FC236}">
+                <a16:creationId xmlns:a16="http://schemas.microsoft.com/office/drawing/2014/main" id="{6F6610FC-1045-A747-AE0F-3A4389E7ED39}"/>
+              </a:ext>
+            </a:extLst>
+          </p:cNvPr>
+          <p:cNvSpPr/>
+          <p:nvPr/>
+        </p:nvSpPr>
+        <p:spPr>
+          <a:xfrm>
+            <a:off x="8649795" y="1152580"/>
+            <a:ext cx="3153103" cy="515007"/>
+          </a:xfrm>
+          <a:prstGeom prst="rect">
+            <a:avLst/>
+          </a:prstGeom>
+        </p:spPr>
+        <p:style>
+          <a:lnRef idx="2">
+            <a:schemeClr val="accent1">
+              <a:shade val="50000"/>
+            </a:schemeClr>
+          </a:lnRef>
+          <a:fillRef idx="1">
+            <a:schemeClr val="accent1"/>
+          </a:fillRef>
+          <a:effectRef idx="0">
+            <a:schemeClr val="accent1"/>
+          </a:effectRef>
+          <a:fontRef idx="minor">
+            <a:schemeClr val="lt1"/>
+          </a:fontRef>
+        </p:style>
+        <p:txBody>
+          <a:bodyPr rtlCol="0" anchor="ctr"/>
+          <a:lstStyle/>
+          <a:p>
+            <a:pPr algn="ctr"/>
+            <a:r>
+              <a:rPr lang="en-US" dirty="0" err="1"/>
+              <a:t>Ct_lca.v_a_t_p_combined</a:t>
+            </a:r>
+            <a:endParaRPr lang="en-US" dirty="0"/>
+          </a:p>
+        </p:txBody>
+      </p:sp>
+      <p:sp>
+        <p:nvSpPr>
+          <p:cNvPr id="7" name="Rounded Rectangle 6">
+            <a:extLst>
+              <a:ext uri="{FF2B5EF4-FFF2-40B4-BE49-F238E27FC236}">
+                <a16:creationId xmlns:a16="http://schemas.microsoft.com/office/drawing/2014/main" id="{1B1963A8-A09A-E740-8665-F366F5394419}"/>
+              </a:ext>
+            </a:extLst>
+          </p:cNvPr>
+          <p:cNvSpPr/>
+          <p:nvPr/>
+        </p:nvSpPr>
+        <p:spPr>
+          <a:xfrm>
+            <a:off x="5286488" y="2207172"/>
+            <a:ext cx="1918137" cy="336332"/>
+          </a:xfrm>
+          <a:prstGeom prst="roundRect">
+            <a:avLst/>
+          </a:prstGeom>
+          <a:ln/>
+        </p:spPr>
+        <p:style>
+          <a:lnRef idx="3">
+            <a:schemeClr val="lt1"/>
+          </a:lnRef>
+          <a:fillRef idx="1">
+            <a:schemeClr val="accent3"/>
+          </a:fillRef>
+          <a:effectRef idx="1">
+            <a:schemeClr val="accent3"/>
+          </a:effectRef>
+          <a:fontRef idx="minor">
+            <a:schemeClr val="lt1"/>
+          </a:fontRef>
+        </p:style>
+        <p:txBody>
+          <a:bodyPr rtlCol="0" anchor="ctr"/>
+          <a:lstStyle/>
+          <a:p>
+            <a:pPr algn="ctr"/>
+            <a:r>
+              <a:rPr lang="en-US" dirty="0" err="1"/>
+              <a:t>Trial_attr_used</a:t>
+            </a:r>
+            <a:endParaRPr lang="en-US" dirty="0"/>
+          </a:p>
+        </p:txBody>
+      </p:sp>
+      <p:sp>
+        <p:nvSpPr>
+          <p:cNvPr id="8" name="Rounded Rectangle 7">
+            <a:extLst>
+              <a:ext uri="{FF2B5EF4-FFF2-40B4-BE49-F238E27FC236}">
+                <a16:creationId xmlns:a16="http://schemas.microsoft.com/office/drawing/2014/main" id="{61B5F739-E6FF-3F4C-B7F9-BAF6245D2BA1}"/>
+              </a:ext>
+            </a:extLst>
+          </p:cNvPr>
+          <p:cNvSpPr/>
+          <p:nvPr/>
+        </p:nvSpPr>
+        <p:spPr>
+          <a:xfrm>
+            <a:off x="2138635" y="2207172"/>
+            <a:ext cx="1918137" cy="336332"/>
+          </a:xfrm>
+          <a:prstGeom prst="roundRect">
+            <a:avLst/>
+          </a:prstGeom>
+          <a:ln/>
+        </p:spPr>
+        <p:style>
+          <a:lnRef idx="3">
+            <a:schemeClr val="lt1"/>
+          </a:lnRef>
+          <a:fillRef idx="1">
+            <a:schemeClr val="accent3"/>
+          </a:fillRef>
+          <a:effectRef idx="1">
+            <a:schemeClr val="accent3"/>
+          </a:effectRef>
+          <a:fontRef idx="minor">
+            <a:schemeClr val="lt1"/>
+          </a:fontRef>
+        </p:style>
+        <p:txBody>
+          <a:bodyPr rtlCol="0" anchor="ctr"/>
+          <a:lstStyle/>
+          <a:p>
+            <a:pPr algn="ctr"/>
+            <a:r>
+              <a:rPr lang="en-US" dirty="0" err="1"/>
+              <a:t>Crit_attr_used</a:t>
+            </a:r>
+            <a:endParaRPr lang="en-US" dirty="0"/>
+          </a:p>
+        </p:txBody>
+      </p:sp>
+      <p:sp>
+        <p:nvSpPr>
+          <p:cNvPr id="9" name="Rounded Rectangle 8">
+            <a:extLst>
+              <a:ext uri="{FF2B5EF4-FFF2-40B4-BE49-F238E27FC236}">
+                <a16:creationId xmlns:a16="http://schemas.microsoft.com/office/drawing/2014/main" id="{08AE01FD-F0C7-B449-A0DA-65B5EA7CE8CA}"/>
+              </a:ext>
+            </a:extLst>
+          </p:cNvPr>
+          <p:cNvSpPr/>
+          <p:nvPr/>
+        </p:nvSpPr>
+        <p:spPr>
+          <a:xfrm>
+            <a:off x="2138635" y="3029606"/>
+            <a:ext cx="1918137" cy="336332"/>
+          </a:xfrm>
+          <a:prstGeom prst="roundRect">
+            <a:avLst/>
+          </a:prstGeom>
+          <a:ln/>
+        </p:spPr>
+        <p:style>
+          <a:lnRef idx="3">
+            <a:schemeClr val="lt1"/>
+          </a:lnRef>
+          <a:fillRef idx="1">
+            <a:schemeClr val="accent3"/>
+          </a:fillRef>
+          <a:effectRef idx="1">
+            <a:schemeClr val="accent3"/>
+          </a:effectRef>
+          <a:fontRef idx="minor">
+            <a:schemeClr val="lt1"/>
+          </a:fontRef>
+        </p:style>
+        <p:txBody>
+          <a:bodyPr rtlCol="0" anchor="ctr"/>
+          <a:lstStyle/>
+          <a:p>
+            <a:pPr algn="ctr"/>
+            <a:r>
+              <a:rPr lang="en-US" dirty="0" err="1"/>
+              <a:t>Trial_Crit_used</a:t>
+            </a:r>
+            <a:endParaRPr lang="en-US" dirty="0"/>
+          </a:p>
+        </p:txBody>
+      </p:sp>
+      <p:sp>
+        <p:nvSpPr>
+          <p:cNvPr id="10" name="Rounded Rectangle 9">
+            <a:extLst>
+              <a:ext uri="{FF2B5EF4-FFF2-40B4-BE49-F238E27FC236}">
+                <a16:creationId xmlns:a16="http://schemas.microsoft.com/office/drawing/2014/main" id="{C61DB5A7-7056-8F48-A87D-F27C9E7803AC}"/>
+              </a:ext>
+            </a:extLst>
+          </p:cNvPr>
+          <p:cNvSpPr/>
+          <p:nvPr/>
+        </p:nvSpPr>
+        <p:spPr>
+          <a:xfrm>
+            <a:off x="2138635" y="3770065"/>
+            <a:ext cx="1739461" cy="541365"/>
+          </a:xfrm>
+          <a:prstGeom prst="roundRect">
+            <a:avLst/>
+          </a:prstGeom>
+          <a:ln/>
+        </p:spPr>
+        <p:style>
+          <a:lnRef idx="3">
+            <a:schemeClr val="lt1"/>
+          </a:lnRef>
+          <a:fillRef idx="1">
+            <a:schemeClr val="accent3"/>
+          </a:fillRef>
+          <a:effectRef idx="1">
+            <a:schemeClr val="accent3"/>
+          </a:effectRef>
+          <a:fontRef idx="minor">
+            <a:schemeClr val="lt1"/>
+          </a:fontRef>
+        </p:style>
+        <p:txBody>
+          <a:bodyPr rtlCol="0" anchor="ctr"/>
+          <a:lstStyle/>
+          <a:p>
+            <a:pPr algn="ctr"/>
+            <a:r>
+              <a:rPr lang="en-US" dirty="0" err="1"/>
+              <a:t>Trial_Crit_used_summary</a:t>
+            </a:r>
+            <a:endParaRPr lang="en-US" dirty="0"/>
+          </a:p>
+        </p:txBody>
+      </p:sp>
+      <p:sp>
+        <p:nvSpPr>
+          <p:cNvPr id="11" name="Rounded Rectangle 10">
+            <a:extLst>
+              <a:ext uri="{FF2B5EF4-FFF2-40B4-BE49-F238E27FC236}">
+                <a16:creationId xmlns:a16="http://schemas.microsoft.com/office/drawing/2014/main" id="{587A57CF-516E-4141-9404-13DF3AB2213B}"/>
+              </a:ext>
+            </a:extLst>
+          </p:cNvPr>
+          <p:cNvSpPr/>
+          <p:nvPr/>
+        </p:nvSpPr>
+        <p:spPr>
+          <a:xfrm>
+            <a:off x="5286488" y="3596721"/>
+            <a:ext cx="1918137" cy="336332"/>
+          </a:xfrm>
+          <a:prstGeom prst="roundRect">
+            <a:avLst/>
+          </a:prstGeom>
+          <a:ln/>
+        </p:spPr>
+        <p:style>
+          <a:lnRef idx="3">
+            <a:schemeClr val="lt1"/>
+          </a:lnRef>
+          <a:fillRef idx="1">
+            <a:schemeClr val="accent3"/>
+          </a:fillRef>
+          <a:effectRef idx="1">
+            <a:schemeClr val="accent3"/>
+          </a:effectRef>
+          <a:fontRef idx="minor">
+            <a:schemeClr val="lt1"/>
+          </a:fontRef>
+        </p:style>
+        <p:txBody>
+          <a:bodyPr rtlCol="0" anchor="ctr"/>
+          <a:lstStyle/>
+          <a:p>
+            <a:pPr algn="ctr"/>
+            <a:r>
+              <a:rPr lang="en-US" dirty="0" err="1"/>
+              <a:t>Master_sheet</a:t>
+            </a:r>
+            <a:endParaRPr lang="en-US" dirty="0"/>
+          </a:p>
+        </p:txBody>
+      </p:sp>
+      <p:sp>
+        <p:nvSpPr>
+          <p:cNvPr id="12" name="Rounded Rectangle 11">
+            <a:extLst>
+              <a:ext uri="{FF2B5EF4-FFF2-40B4-BE49-F238E27FC236}">
+                <a16:creationId xmlns:a16="http://schemas.microsoft.com/office/drawing/2014/main" id="{960753FA-711A-9C49-9F4A-B19E922E09EF}"/>
+              </a:ext>
+            </a:extLst>
+          </p:cNvPr>
+          <p:cNvSpPr/>
+          <p:nvPr/>
+        </p:nvSpPr>
+        <p:spPr>
+          <a:xfrm>
+            <a:off x="5038180" y="4174356"/>
+            <a:ext cx="2414752" cy="336332"/>
+          </a:xfrm>
+          <a:prstGeom prst="roundRect">
+            <a:avLst/>
+          </a:prstGeom>
+          <a:ln/>
+        </p:spPr>
+        <p:style>
+          <a:lnRef idx="3">
+            <a:schemeClr val="lt1"/>
+          </a:lnRef>
+          <a:fillRef idx="1">
+            <a:schemeClr val="accent3"/>
+          </a:fillRef>
+          <a:effectRef idx="1">
+            <a:schemeClr val="accent3"/>
+          </a:effectRef>
+          <a:fontRef idx="minor">
+            <a:schemeClr val="lt1"/>
+          </a:fontRef>
+        </p:style>
+        <p:txBody>
+          <a:bodyPr rtlCol="0" anchor="ctr"/>
+          <a:lstStyle/>
+          <a:p>
+            <a:pPr algn="ctr"/>
+            <a:r>
+              <a:rPr lang="en-US" dirty="0" err="1"/>
+              <a:t>Master_sheet_w_crit</a:t>
+            </a:r>
+            <a:endParaRPr lang="en-US" dirty="0"/>
+          </a:p>
+        </p:txBody>
+      </p:sp>
+      <p:sp>
+        <p:nvSpPr>
+          <p:cNvPr id="13" name="Rounded Rectangle 12">
+            <a:extLst>
+              <a:ext uri="{FF2B5EF4-FFF2-40B4-BE49-F238E27FC236}">
+                <a16:creationId xmlns:a16="http://schemas.microsoft.com/office/drawing/2014/main" id="{2077DA88-DEA8-5F43-8CF5-97DA998C14F6}"/>
+              </a:ext>
+            </a:extLst>
+          </p:cNvPr>
+          <p:cNvSpPr/>
+          <p:nvPr/>
+        </p:nvSpPr>
+        <p:spPr>
+          <a:xfrm>
+            <a:off x="5159049" y="4902424"/>
+            <a:ext cx="2173014" cy="336332"/>
+          </a:xfrm>
+          <a:prstGeom prst="roundRect">
+            <a:avLst/>
+          </a:prstGeom>
+          <a:ln/>
+        </p:spPr>
+        <p:style>
+          <a:lnRef idx="3">
+            <a:schemeClr val="lt1"/>
+          </a:lnRef>
+          <a:fillRef idx="1">
+            <a:schemeClr val="accent3"/>
+          </a:fillRef>
+          <a:effectRef idx="1">
+            <a:schemeClr val="accent3"/>
+          </a:effectRef>
+          <a:fontRef idx="minor">
+            <a:schemeClr val="lt1"/>
+          </a:fontRef>
+        </p:style>
+        <p:txBody>
+          <a:bodyPr rtlCol="0" anchor="ctr"/>
+          <a:lstStyle/>
+          <a:p>
+            <a:pPr algn="ctr"/>
+            <a:r>
+              <a:rPr lang="en-US" dirty="0" err="1"/>
+              <a:t>Crit_pass_no_nulls</a:t>
+            </a:r>
+            <a:endParaRPr lang="en-US" dirty="0"/>
+          </a:p>
+        </p:txBody>
+      </p:sp>
+      <p:sp>
+        <p:nvSpPr>
+          <p:cNvPr id="14" name="Rounded Rectangle 13">
+            <a:extLst>
+              <a:ext uri="{FF2B5EF4-FFF2-40B4-BE49-F238E27FC236}">
+                <a16:creationId xmlns:a16="http://schemas.microsoft.com/office/drawing/2014/main" id="{3AAF8897-2002-0849-B87A-C5016E12AB67}"/>
+              </a:ext>
+            </a:extLst>
+          </p:cNvPr>
+          <p:cNvSpPr/>
+          <p:nvPr/>
+        </p:nvSpPr>
+        <p:spPr>
+          <a:xfrm>
+            <a:off x="5159049" y="5431417"/>
+            <a:ext cx="2173014" cy="336332"/>
+          </a:xfrm>
+          <a:prstGeom prst="roundRect">
+            <a:avLst/>
+          </a:prstGeom>
+          <a:ln/>
+        </p:spPr>
+        <p:style>
+          <a:lnRef idx="3">
+            <a:schemeClr val="lt1"/>
+          </a:lnRef>
+          <a:fillRef idx="1">
+            <a:schemeClr val="accent3"/>
+          </a:fillRef>
+          <a:effectRef idx="1">
+            <a:schemeClr val="accent3"/>
+          </a:effectRef>
+          <a:fontRef idx="minor">
+            <a:schemeClr val="lt1"/>
+          </a:fontRef>
+        </p:style>
+        <p:txBody>
+          <a:bodyPr rtlCol="0" anchor="ctr"/>
+          <a:lstStyle/>
+          <a:p>
+            <a:pPr algn="ctr"/>
+            <a:r>
+              <a:rPr lang="en-US" dirty="0" err="1"/>
+              <a:t>Crit_pass_summary</a:t>
+            </a:r>
+            <a:endParaRPr lang="en-US" dirty="0"/>
+          </a:p>
+        </p:txBody>
+      </p:sp>
+      <p:sp>
+        <p:nvSpPr>
+          <p:cNvPr id="15" name="Rounded Rectangle 14">
+            <a:extLst>
+              <a:ext uri="{FF2B5EF4-FFF2-40B4-BE49-F238E27FC236}">
+                <a16:creationId xmlns:a16="http://schemas.microsoft.com/office/drawing/2014/main" id="{FFA6AAF1-CD9C-A941-937C-9BE3861E58BC}"/>
+              </a:ext>
+            </a:extLst>
+          </p:cNvPr>
+          <p:cNvSpPr/>
+          <p:nvPr/>
+        </p:nvSpPr>
+        <p:spPr>
+          <a:xfrm>
+            <a:off x="5159049" y="6016083"/>
+            <a:ext cx="2173014" cy="336332"/>
+          </a:xfrm>
+          <a:prstGeom prst="roundRect">
+            <a:avLst/>
+          </a:prstGeom>
+          <a:ln/>
+        </p:spPr>
+        <p:style>
+          <a:lnRef idx="3">
+            <a:schemeClr val="lt1"/>
+          </a:lnRef>
+          <a:fillRef idx="1">
+            <a:schemeClr val="accent3"/>
+          </a:fillRef>
+          <a:effectRef idx="1">
+            <a:schemeClr val="accent3"/>
+          </a:effectRef>
+          <a:fontRef idx="minor">
+            <a:schemeClr val="lt1"/>
+          </a:fontRef>
+        </p:style>
+        <p:txBody>
+          <a:bodyPr rtlCol="0" anchor="ctr"/>
+          <a:lstStyle/>
+          <a:p>
+            <a:pPr algn="ctr"/>
+            <a:r>
+              <a:rPr lang="en-US" dirty="0"/>
+              <a:t>Trial2patient</a:t>
+            </a:r>
+          </a:p>
+        </p:txBody>
+      </p:sp>
+      <p:cxnSp>
+        <p:nvCxnSpPr>
+          <p:cNvPr id="16" name="Curved Connector 15">
+            <a:extLst>
+              <a:ext uri="{FF2B5EF4-FFF2-40B4-BE49-F238E27FC236}">
+                <a16:creationId xmlns:a16="http://schemas.microsoft.com/office/drawing/2014/main" id="{BA1A9465-4084-8940-841A-45A619E5CC83}"/>
+              </a:ext>
+            </a:extLst>
+          </p:cNvPr>
+          <p:cNvCxnSpPr/>
+          <p:nvPr/>
+        </p:nvCxnSpPr>
+        <p:spPr>
+          <a:xfrm rot="5400000">
+            <a:off x="6721998" y="943299"/>
+            <a:ext cx="539584" cy="12700"/>
+          </a:xfrm>
+          <a:prstGeom prst="curvedConnector3">
+            <a:avLst/>
+          </a:prstGeom>
+          <a:ln>
+            <a:tailEnd type="triangle"/>
+          </a:ln>
+        </p:spPr>
+        <p:style>
+          <a:lnRef idx="1">
+            <a:schemeClr val="accent1"/>
+          </a:lnRef>
+          <a:fillRef idx="0">
+            <a:schemeClr val="accent1"/>
+          </a:fillRef>
+          <a:effectRef idx="0">
+            <a:schemeClr val="accent1"/>
+          </a:effectRef>
+          <a:fontRef idx="minor">
+            <a:schemeClr val="tx1"/>
+          </a:fontRef>
+        </p:style>
+      </p:cxnSp>
+      <p:cxnSp>
+        <p:nvCxnSpPr>
+          <p:cNvPr id="17" name="Curved Connector 16">
+            <a:extLst>
+              <a:ext uri="{FF2B5EF4-FFF2-40B4-BE49-F238E27FC236}">
+                <a16:creationId xmlns:a16="http://schemas.microsoft.com/office/drawing/2014/main" id="{1D211D87-BEFF-F246-8FE1-355ED07D184C}"/>
+              </a:ext>
+            </a:extLst>
+          </p:cNvPr>
+          <p:cNvCxnSpPr>
+            <a:cxnSpLocks/>
+          </p:cNvCxnSpPr>
+          <p:nvPr/>
+        </p:nvCxnSpPr>
+        <p:spPr>
+          <a:xfrm rot="5400000">
+            <a:off x="5718948" y="3070112"/>
+            <a:ext cx="1053217" cy="12700"/>
+          </a:xfrm>
+          <a:prstGeom prst="curvedConnector3">
+            <a:avLst/>
+          </a:prstGeom>
+          <a:ln>
+            <a:tailEnd type="triangle"/>
+          </a:ln>
+        </p:spPr>
+        <p:style>
+          <a:lnRef idx="1">
+            <a:schemeClr val="accent1"/>
+          </a:lnRef>
+          <a:fillRef idx="0">
+            <a:schemeClr val="accent1"/>
+          </a:fillRef>
+          <a:effectRef idx="0">
+            <a:schemeClr val="accent1"/>
+          </a:effectRef>
+          <a:fontRef idx="minor">
+            <a:schemeClr val="tx1"/>
+          </a:fontRef>
+        </p:style>
+      </p:cxnSp>
+      <p:cxnSp>
+        <p:nvCxnSpPr>
+          <p:cNvPr id="18" name="Curved Connector 17">
+            <a:extLst>
+              <a:ext uri="{FF2B5EF4-FFF2-40B4-BE49-F238E27FC236}">
+                <a16:creationId xmlns:a16="http://schemas.microsoft.com/office/drawing/2014/main" id="{7C782A8B-6400-E24B-8B0B-E10AB5116181}"/>
+              </a:ext>
+            </a:extLst>
+          </p:cNvPr>
+          <p:cNvCxnSpPr>
+            <a:cxnSpLocks/>
+          </p:cNvCxnSpPr>
+          <p:nvPr/>
+        </p:nvCxnSpPr>
+        <p:spPr>
+          <a:xfrm rot="5400000">
+            <a:off x="6121389" y="5891916"/>
+            <a:ext cx="248334" cy="12700"/>
+          </a:xfrm>
+          <a:prstGeom prst="curvedConnector3">
+            <a:avLst/>
+          </a:prstGeom>
+          <a:ln>
+            <a:tailEnd type="triangle"/>
+          </a:ln>
+        </p:spPr>
+        <p:style>
+          <a:lnRef idx="1">
+            <a:schemeClr val="accent1"/>
+          </a:lnRef>
+          <a:fillRef idx="0">
+            <a:schemeClr val="accent1"/>
+          </a:fillRef>
+          <a:effectRef idx="0">
+            <a:schemeClr val="accent1"/>
+          </a:effectRef>
+          <a:fontRef idx="minor">
+            <a:schemeClr val="tx1"/>
+          </a:fontRef>
+        </p:style>
+      </p:cxnSp>
+      <p:cxnSp>
+        <p:nvCxnSpPr>
+          <p:cNvPr id="19" name="Curved Connector 18">
+            <a:extLst>
+              <a:ext uri="{FF2B5EF4-FFF2-40B4-BE49-F238E27FC236}">
+                <a16:creationId xmlns:a16="http://schemas.microsoft.com/office/drawing/2014/main" id="{A18C7C3B-BC15-EB47-8CC3-55D5BC54D9E7}"/>
+              </a:ext>
+            </a:extLst>
+          </p:cNvPr>
+          <p:cNvCxnSpPr>
+            <a:cxnSpLocks/>
+          </p:cNvCxnSpPr>
+          <p:nvPr/>
+        </p:nvCxnSpPr>
+        <p:spPr>
+          <a:xfrm rot="5400000">
+            <a:off x="6149226" y="5335086"/>
+            <a:ext cx="192661" cy="12700"/>
+          </a:xfrm>
+          <a:prstGeom prst="curvedConnector3">
+            <a:avLst>
+              <a:gd name="adj1" fmla="val 50000"/>
+            </a:avLst>
+          </a:prstGeom>
+          <a:ln>
+            <a:tailEnd type="triangle"/>
+          </a:ln>
+        </p:spPr>
+        <p:style>
+          <a:lnRef idx="1">
+            <a:schemeClr val="accent1"/>
+          </a:lnRef>
+          <a:fillRef idx="0">
+            <a:schemeClr val="accent1"/>
+          </a:fillRef>
+          <a:effectRef idx="0">
+            <a:schemeClr val="accent1"/>
+          </a:effectRef>
+          <a:fontRef idx="minor">
+            <a:schemeClr val="tx1"/>
+          </a:fontRef>
+        </p:style>
+      </p:cxnSp>
+      <p:cxnSp>
+        <p:nvCxnSpPr>
+          <p:cNvPr id="20" name="Curved Connector 19">
+            <a:extLst>
+              <a:ext uri="{FF2B5EF4-FFF2-40B4-BE49-F238E27FC236}">
+                <a16:creationId xmlns:a16="http://schemas.microsoft.com/office/drawing/2014/main" id="{843314AF-94C0-1441-800C-5C9B597AC93F}"/>
+              </a:ext>
+            </a:extLst>
+          </p:cNvPr>
+          <p:cNvCxnSpPr>
+            <a:cxnSpLocks/>
+          </p:cNvCxnSpPr>
+          <p:nvPr/>
+        </p:nvCxnSpPr>
+        <p:spPr>
+          <a:xfrm rot="5400000">
+            <a:off x="6049688" y="4706556"/>
+            <a:ext cx="391736" cy="12700"/>
+          </a:xfrm>
+          <a:prstGeom prst="curvedConnector3">
+            <a:avLst>
+              <a:gd name="adj1" fmla="val 50000"/>
+            </a:avLst>
+          </a:prstGeom>
+          <a:ln>
+            <a:tailEnd type="triangle"/>
+          </a:ln>
+        </p:spPr>
+        <p:style>
+          <a:lnRef idx="1">
+            <a:schemeClr val="accent1"/>
+          </a:lnRef>
+          <a:fillRef idx="0">
+            <a:schemeClr val="accent1"/>
+          </a:fillRef>
+          <a:effectRef idx="0">
+            <a:schemeClr val="accent1"/>
+          </a:effectRef>
+          <a:fontRef idx="minor">
+            <a:schemeClr val="tx1"/>
+          </a:fontRef>
+        </p:style>
+      </p:cxnSp>
+      <p:cxnSp>
+        <p:nvCxnSpPr>
+          <p:cNvPr id="21" name="Curved Connector 20">
+            <a:extLst>
+              <a:ext uri="{FF2B5EF4-FFF2-40B4-BE49-F238E27FC236}">
+                <a16:creationId xmlns:a16="http://schemas.microsoft.com/office/drawing/2014/main" id="{A55596F1-DA1A-F942-A999-DA30BB295379}"/>
+              </a:ext>
+            </a:extLst>
+          </p:cNvPr>
+          <p:cNvCxnSpPr>
+            <a:cxnSpLocks/>
+          </p:cNvCxnSpPr>
+          <p:nvPr/>
+        </p:nvCxnSpPr>
+        <p:spPr>
+          <a:xfrm rot="5400000">
+            <a:off x="6124905" y="4053704"/>
+            <a:ext cx="241303" cy="1"/>
+          </a:xfrm>
+          <a:prstGeom prst="curvedConnector3">
+            <a:avLst/>
+          </a:prstGeom>
+          <a:ln>
+            <a:tailEnd type="triangle"/>
+          </a:ln>
+        </p:spPr>
+        <p:style>
+          <a:lnRef idx="1">
+            <a:schemeClr val="accent1"/>
+          </a:lnRef>
+          <a:fillRef idx="0">
+            <a:schemeClr val="accent1"/>
+          </a:fillRef>
+          <a:effectRef idx="0">
+            <a:schemeClr val="accent1"/>
+          </a:effectRef>
+          <a:fontRef idx="minor">
+            <a:schemeClr val="tx1"/>
+          </a:fontRef>
+        </p:style>
+      </p:cxnSp>
+      <p:cxnSp>
+        <p:nvCxnSpPr>
+          <p:cNvPr id="22" name="Curved Connector 21">
+            <a:extLst>
+              <a:ext uri="{FF2B5EF4-FFF2-40B4-BE49-F238E27FC236}">
+                <a16:creationId xmlns:a16="http://schemas.microsoft.com/office/drawing/2014/main" id="{01674A07-390A-1F40-ABC4-06BF2A5A25DA}"/>
+              </a:ext>
+            </a:extLst>
+          </p:cNvPr>
+          <p:cNvCxnSpPr>
+            <a:cxnSpLocks/>
+            <a:stCxn id="6" idx="2"/>
+            <a:endCxn id="11" idx="0"/>
+          </p:cNvCxnSpPr>
+          <p:nvPr/>
+        </p:nvCxnSpPr>
+        <p:spPr>
+          <a:xfrm rot="5400000">
+            <a:off x="7271385" y="641759"/>
+            <a:ext cx="1929134" cy="3980790"/>
+          </a:xfrm>
+          <a:prstGeom prst="curvedConnector3">
+            <a:avLst/>
+          </a:prstGeom>
+          <a:ln>
+            <a:tailEnd type="triangle"/>
+          </a:ln>
+        </p:spPr>
+        <p:style>
+          <a:lnRef idx="1">
+            <a:schemeClr val="accent1"/>
+          </a:lnRef>
+          <a:fillRef idx="0">
+            <a:schemeClr val="accent1"/>
+          </a:fillRef>
+          <a:effectRef idx="0">
+            <a:schemeClr val="accent1"/>
+          </a:effectRef>
+          <a:fontRef idx="minor">
+            <a:schemeClr val="tx1"/>
+          </a:fontRef>
+        </p:style>
+      </p:cxnSp>
+      <p:cxnSp>
+        <p:nvCxnSpPr>
+          <p:cNvPr id="23" name="Curved Connector 22">
+            <a:extLst>
+              <a:ext uri="{FF2B5EF4-FFF2-40B4-BE49-F238E27FC236}">
+                <a16:creationId xmlns:a16="http://schemas.microsoft.com/office/drawing/2014/main" id="{0D082263-DA0B-E14C-9CB0-336FBB0402A0}"/>
+              </a:ext>
+            </a:extLst>
+          </p:cNvPr>
+          <p:cNvCxnSpPr>
+            <a:cxnSpLocks/>
+            <a:stCxn id="8" idx="2"/>
+            <a:endCxn id="9" idx="0"/>
+          </p:cNvCxnSpPr>
+          <p:nvPr/>
+        </p:nvCxnSpPr>
+        <p:spPr>
+          <a:xfrm rot="5400000">
+            <a:off x="2854653" y="2786555"/>
+            <a:ext cx="486102" cy="12700"/>
+          </a:xfrm>
+          <a:prstGeom prst="curvedConnector3">
+            <a:avLst/>
+          </a:prstGeom>
+          <a:ln>
+            <a:tailEnd type="triangle"/>
+          </a:ln>
+        </p:spPr>
+        <p:style>
+          <a:lnRef idx="1">
+            <a:schemeClr val="accent1"/>
+          </a:lnRef>
+          <a:fillRef idx="0">
+            <a:schemeClr val="accent1"/>
+          </a:fillRef>
+          <a:effectRef idx="0">
+            <a:schemeClr val="accent1"/>
+          </a:effectRef>
+          <a:fontRef idx="minor">
+            <a:schemeClr val="tx1"/>
+          </a:fontRef>
+        </p:style>
+      </p:cxnSp>
+      <p:cxnSp>
+        <p:nvCxnSpPr>
+          <p:cNvPr id="24" name="Curved Connector 23">
+            <a:extLst>
+              <a:ext uri="{FF2B5EF4-FFF2-40B4-BE49-F238E27FC236}">
+                <a16:creationId xmlns:a16="http://schemas.microsoft.com/office/drawing/2014/main" id="{D9923E8E-616F-1A41-A73D-0CD241EDECF8}"/>
+              </a:ext>
+            </a:extLst>
+          </p:cNvPr>
+          <p:cNvCxnSpPr>
+            <a:cxnSpLocks/>
+            <a:stCxn id="9" idx="2"/>
+            <a:endCxn id="10" idx="0"/>
+          </p:cNvCxnSpPr>
+          <p:nvPr/>
+        </p:nvCxnSpPr>
+        <p:spPr>
+          <a:xfrm rot="5400000">
+            <a:off x="2850972" y="3523332"/>
+            <a:ext cx="404127" cy="89338"/>
+          </a:xfrm>
+          <a:prstGeom prst="curvedConnector3">
+            <a:avLst>
+              <a:gd name="adj1" fmla="val 50000"/>
+            </a:avLst>
+          </a:prstGeom>
+          <a:ln>
+            <a:tailEnd type="triangle"/>
+          </a:ln>
+        </p:spPr>
+        <p:style>
+          <a:lnRef idx="1">
+            <a:schemeClr val="accent1"/>
+          </a:lnRef>
+          <a:fillRef idx="0">
+            <a:schemeClr val="accent1"/>
+          </a:fillRef>
+          <a:effectRef idx="0">
+            <a:schemeClr val="accent1"/>
+          </a:effectRef>
+          <a:fontRef idx="minor">
+            <a:schemeClr val="tx1"/>
+          </a:fontRef>
+        </p:style>
+      </p:cxnSp>
+      <p:cxnSp>
+        <p:nvCxnSpPr>
+          <p:cNvPr id="25" name="Curved Connector 24">
+            <a:extLst>
+              <a:ext uri="{FF2B5EF4-FFF2-40B4-BE49-F238E27FC236}">
+                <a16:creationId xmlns:a16="http://schemas.microsoft.com/office/drawing/2014/main" id="{96183053-8114-A944-BDA8-D2ADD15DB502}"/>
+              </a:ext>
+            </a:extLst>
+          </p:cNvPr>
+          <p:cNvCxnSpPr>
+            <a:cxnSpLocks/>
+            <a:stCxn id="10" idx="2"/>
+            <a:endCxn id="14" idx="0"/>
+          </p:cNvCxnSpPr>
+          <p:nvPr/>
+        </p:nvCxnSpPr>
+        <p:spPr>
+          <a:xfrm rot="16200000" flipH="1">
+            <a:off x="4066968" y="3252828"/>
+            <a:ext cx="1119987" cy="3237190"/>
+          </a:xfrm>
+          <a:prstGeom prst="curvedConnector3">
+            <a:avLst/>
+          </a:prstGeom>
+          <a:ln>
+            <a:tailEnd type="triangle"/>
+          </a:ln>
+        </p:spPr>
+        <p:style>
+          <a:lnRef idx="1">
+            <a:schemeClr val="accent1"/>
+          </a:lnRef>
+          <a:fillRef idx="0">
+            <a:schemeClr val="accent1"/>
+          </a:fillRef>
+          <a:effectRef idx="0">
+            <a:schemeClr val="accent1"/>
+          </a:effectRef>
+          <a:fontRef idx="minor">
+            <a:schemeClr val="tx1"/>
+          </a:fontRef>
+        </p:style>
+      </p:cxnSp>
+      <p:cxnSp>
+        <p:nvCxnSpPr>
+          <p:cNvPr id="26" name="Curved Connector 25">
+            <a:extLst>
+              <a:ext uri="{FF2B5EF4-FFF2-40B4-BE49-F238E27FC236}">
+                <a16:creationId xmlns:a16="http://schemas.microsoft.com/office/drawing/2014/main" id="{B235A172-D08C-6042-B8ED-34B7ED160BE1}"/>
+              </a:ext>
+            </a:extLst>
+          </p:cNvPr>
+          <p:cNvCxnSpPr>
+            <a:cxnSpLocks/>
+            <a:stCxn id="4" idx="2"/>
+            <a:endCxn id="8" idx="0"/>
+          </p:cNvCxnSpPr>
+          <p:nvPr/>
+        </p:nvCxnSpPr>
+        <p:spPr>
+          <a:xfrm rot="16200000" flipH="1">
+            <a:off x="2835712" y="1945179"/>
+            <a:ext cx="484571" cy="39414"/>
+          </a:xfrm>
+          <a:prstGeom prst="curvedConnector3">
+            <a:avLst/>
+          </a:prstGeom>
+          <a:ln>
+            <a:tailEnd type="triangle"/>
+          </a:ln>
+        </p:spPr>
+        <p:style>
+          <a:lnRef idx="1">
+            <a:schemeClr val="accent1"/>
+          </a:lnRef>
+          <a:fillRef idx="0">
+            <a:schemeClr val="accent1"/>
+          </a:fillRef>
+          <a:effectRef idx="0">
+            <a:schemeClr val="accent1"/>
+          </a:effectRef>
+          <a:fontRef idx="minor">
+            <a:schemeClr val="tx1"/>
+          </a:fontRef>
+        </p:style>
+      </p:cxnSp>
+      <p:cxnSp>
+        <p:nvCxnSpPr>
+          <p:cNvPr id="27" name="Curved Connector 26">
+            <a:extLst>
+              <a:ext uri="{FF2B5EF4-FFF2-40B4-BE49-F238E27FC236}">
+                <a16:creationId xmlns:a16="http://schemas.microsoft.com/office/drawing/2014/main" id="{D1004699-C118-E74A-9A2F-ED521F28F2CC}"/>
+              </a:ext>
+            </a:extLst>
+          </p:cNvPr>
+          <p:cNvCxnSpPr>
+            <a:cxnSpLocks/>
+            <a:stCxn id="7" idx="2"/>
+            <a:endCxn id="8" idx="0"/>
+          </p:cNvCxnSpPr>
+          <p:nvPr/>
+        </p:nvCxnSpPr>
+        <p:spPr>
+          <a:xfrm rot="5400000" flipH="1">
+            <a:off x="4503465" y="801412"/>
+            <a:ext cx="336332" cy="3147853"/>
+          </a:xfrm>
+          <a:prstGeom prst="curvedConnector5">
+            <a:avLst>
+              <a:gd name="adj1" fmla="val -67969"/>
+              <a:gd name="adj2" fmla="val 50000"/>
+              <a:gd name="adj3" fmla="val 167969"/>
+            </a:avLst>
+          </a:prstGeom>
+          <a:ln>
+            <a:tailEnd type="triangle"/>
+          </a:ln>
+        </p:spPr>
+        <p:style>
+          <a:lnRef idx="1">
+            <a:schemeClr val="accent1"/>
+          </a:lnRef>
+          <a:fillRef idx="0">
+            <a:schemeClr val="accent1"/>
+          </a:fillRef>
+          <a:effectRef idx="0">
+            <a:schemeClr val="accent1"/>
+          </a:effectRef>
+          <a:fontRef idx="minor">
+            <a:schemeClr val="tx1"/>
+          </a:fontRef>
+        </p:style>
+      </p:cxnSp>
+      <p:cxnSp>
+        <p:nvCxnSpPr>
+          <p:cNvPr id="28" name="Curved Connector 27">
+            <a:extLst>
+              <a:ext uri="{FF2B5EF4-FFF2-40B4-BE49-F238E27FC236}">
+                <a16:creationId xmlns:a16="http://schemas.microsoft.com/office/drawing/2014/main" id="{C2E58228-686F-A945-AC8B-E770E1CE3117}"/>
+              </a:ext>
+            </a:extLst>
+          </p:cNvPr>
+          <p:cNvCxnSpPr>
+            <a:cxnSpLocks/>
+            <a:stCxn id="7" idx="3"/>
+            <a:endCxn id="30" idx="0"/>
+          </p:cNvCxnSpPr>
+          <p:nvPr/>
+        </p:nvCxnSpPr>
+        <p:spPr>
+          <a:xfrm flipV="1">
+            <a:off x="7204625" y="2029837"/>
+            <a:ext cx="932136" cy="345501"/>
+          </a:xfrm>
+          <a:prstGeom prst="curvedConnector4">
+            <a:avLst>
+              <a:gd name="adj1" fmla="val 13319"/>
+              <a:gd name="adj2" fmla="val 166165"/>
+            </a:avLst>
+          </a:prstGeom>
+          <a:ln>
+            <a:tailEnd type="triangle"/>
+          </a:ln>
+        </p:spPr>
+        <p:style>
+          <a:lnRef idx="1">
+            <a:schemeClr val="accent1"/>
+          </a:lnRef>
+          <a:fillRef idx="0">
+            <a:schemeClr val="accent1"/>
+          </a:fillRef>
+          <a:effectRef idx="0">
+            <a:schemeClr val="accent1"/>
+          </a:effectRef>
+          <a:fontRef idx="minor">
+            <a:schemeClr val="tx1"/>
+          </a:fontRef>
+        </p:style>
+      </p:cxnSp>
+      <p:cxnSp>
+        <p:nvCxnSpPr>
+          <p:cNvPr id="29" name="Curved Connector 28">
+            <a:extLst>
+              <a:ext uri="{FF2B5EF4-FFF2-40B4-BE49-F238E27FC236}">
+                <a16:creationId xmlns:a16="http://schemas.microsoft.com/office/drawing/2014/main" id="{0F22CFEF-7B8C-2D43-A82C-77D05B08ED6B}"/>
+              </a:ext>
+            </a:extLst>
+          </p:cNvPr>
+          <p:cNvCxnSpPr>
+            <a:cxnSpLocks/>
+            <a:stCxn id="8" idx="2"/>
+            <a:endCxn id="11" idx="0"/>
+          </p:cNvCxnSpPr>
+          <p:nvPr/>
+        </p:nvCxnSpPr>
+        <p:spPr>
+          <a:xfrm rot="16200000" flipH="1">
+            <a:off x="4145022" y="1496185"/>
+            <a:ext cx="1053217" cy="3147853"/>
+          </a:xfrm>
+          <a:prstGeom prst="curvedConnector3">
+            <a:avLst>
+              <a:gd name="adj1" fmla="val 50000"/>
+            </a:avLst>
+          </a:prstGeom>
+          <a:ln>
+            <a:tailEnd type="triangle"/>
+          </a:ln>
+        </p:spPr>
+        <p:style>
+          <a:lnRef idx="1">
+            <a:schemeClr val="accent1"/>
+          </a:lnRef>
+          <a:fillRef idx="0">
+            <a:schemeClr val="accent1"/>
+          </a:fillRef>
+          <a:effectRef idx="0">
+            <a:schemeClr val="accent1"/>
+          </a:effectRef>
+          <a:fontRef idx="minor">
+            <a:schemeClr val="tx1"/>
+          </a:fontRef>
+        </p:style>
+      </p:cxnSp>
+      <p:sp>
+        <p:nvSpPr>
+          <p:cNvPr id="30" name="Rounded Rectangle 29">
+            <a:extLst>
+              <a:ext uri="{FF2B5EF4-FFF2-40B4-BE49-F238E27FC236}">
+                <a16:creationId xmlns:a16="http://schemas.microsoft.com/office/drawing/2014/main" id="{78848759-352C-7A4C-9852-085BD772907C}"/>
+              </a:ext>
+            </a:extLst>
+          </p:cNvPr>
+          <p:cNvSpPr/>
+          <p:nvPr/>
+        </p:nvSpPr>
+        <p:spPr>
+          <a:xfrm>
+            <a:off x="7452932" y="2029837"/>
+            <a:ext cx="1367657" cy="336332"/>
+          </a:xfrm>
+          <a:prstGeom prst="roundRect">
+            <a:avLst/>
+          </a:prstGeom>
+          <a:ln/>
+        </p:spPr>
+        <p:style>
+          <a:lnRef idx="3">
+            <a:schemeClr val="lt1"/>
+          </a:lnRef>
+          <a:fillRef idx="1">
+            <a:schemeClr val="accent3"/>
+          </a:fillRef>
+          <a:effectRef idx="1">
+            <a:schemeClr val="accent3"/>
+          </a:effectRef>
+          <a:fontRef idx="minor">
+            <a:schemeClr val="lt1"/>
+          </a:fontRef>
+        </p:style>
+        <p:txBody>
+          <a:bodyPr rtlCol="0" anchor="ctr"/>
+          <a:lstStyle/>
+          <a:p>
+            <a:pPr algn="ctr"/>
+            <a:r>
+              <a:rPr lang="en-US" dirty="0" err="1"/>
+              <a:t>attr_used</a:t>
+            </a:r>
+            <a:endParaRPr lang="en-US" dirty="0"/>
+          </a:p>
+        </p:txBody>
+      </p:sp>
+      <p:cxnSp>
+        <p:nvCxnSpPr>
+          <p:cNvPr id="31" name="Curved Connector 30">
+            <a:extLst>
+              <a:ext uri="{FF2B5EF4-FFF2-40B4-BE49-F238E27FC236}">
+                <a16:creationId xmlns:a16="http://schemas.microsoft.com/office/drawing/2014/main" id="{E6E8A812-1FB6-054E-9813-BAC4AAB3EB71}"/>
+              </a:ext>
+            </a:extLst>
+          </p:cNvPr>
+          <p:cNvCxnSpPr>
+            <a:cxnSpLocks/>
+            <a:stCxn id="9" idx="2"/>
+            <a:endCxn id="12" idx="0"/>
+          </p:cNvCxnSpPr>
+          <p:nvPr/>
+        </p:nvCxnSpPr>
+        <p:spPr>
+          <a:xfrm rot="16200000" flipH="1">
+            <a:off x="4267421" y="2196221"/>
+            <a:ext cx="808418" cy="3147852"/>
+          </a:xfrm>
+          <a:prstGeom prst="curvedConnector3">
+            <a:avLst>
+              <a:gd name="adj1" fmla="val 50000"/>
+            </a:avLst>
+          </a:prstGeom>
+          <a:ln>
+            <a:tailEnd type="triangle"/>
+          </a:ln>
+        </p:spPr>
+        <p:style>
+          <a:lnRef idx="1">
+            <a:schemeClr val="accent1"/>
+          </a:lnRef>
+          <a:fillRef idx="0">
+            <a:schemeClr val="accent1"/>
+          </a:fillRef>
+          <a:effectRef idx="0">
+            <a:schemeClr val="accent1"/>
+          </a:effectRef>
+          <a:fontRef idx="minor">
+            <a:schemeClr val="tx1"/>
+          </a:fontRef>
+        </p:style>
+      </p:cxnSp>
+      <p:sp>
+        <p:nvSpPr>
+          <p:cNvPr id="32" name="Rounded Rectangle 31">
+            <a:extLst>
+              <a:ext uri="{FF2B5EF4-FFF2-40B4-BE49-F238E27FC236}">
+                <a16:creationId xmlns:a16="http://schemas.microsoft.com/office/drawing/2014/main" id="{8893AB4E-B542-0840-95FC-85B256FD3BC9}"/>
+              </a:ext>
+            </a:extLst>
+          </p:cNvPr>
+          <p:cNvSpPr/>
+          <p:nvPr/>
+        </p:nvSpPr>
+        <p:spPr>
+          <a:xfrm>
+            <a:off x="225090" y="2356037"/>
+            <a:ext cx="1367657" cy="336332"/>
+          </a:xfrm>
+          <a:prstGeom prst="roundRect">
+            <a:avLst/>
+          </a:prstGeom>
+          <a:ln/>
+        </p:spPr>
+        <p:style>
+          <a:lnRef idx="3">
+            <a:schemeClr val="lt1"/>
+          </a:lnRef>
+          <a:fillRef idx="1">
+            <a:schemeClr val="accent3"/>
+          </a:fillRef>
+          <a:effectRef idx="1">
+            <a:schemeClr val="accent3"/>
+          </a:effectRef>
+          <a:fontRef idx="minor">
+            <a:schemeClr val="lt1"/>
+          </a:fontRef>
+        </p:style>
+        <p:txBody>
+          <a:bodyPr rtlCol="0" anchor="ctr"/>
+          <a:lstStyle/>
+          <a:p>
+            <a:pPr algn="ctr"/>
+            <a:r>
+              <a:rPr lang="en-US" dirty="0" err="1"/>
+              <a:t>crit_used</a:t>
+            </a:r>
+            <a:endParaRPr lang="en-US" dirty="0"/>
+          </a:p>
+        </p:txBody>
+      </p:sp>
+      <p:cxnSp>
+        <p:nvCxnSpPr>
+          <p:cNvPr id="34" name="Curved Connector 33">
+            <a:extLst>
+              <a:ext uri="{FF2B5EF4-FFF2-40B4-BE49-F238E27FC236}">
+                <a16:creationId xmlns:a16="http://schemas.microsoft.com/office/drawing/2014/main" id="{D91A340E-078D-D04A-990C-91FB6739C24E}"/>
+              </a:ext>
+            </a:extLst>
+          </p:cNvPr>
+          <p:cNvCxnSpPr>
+            <a:cxnSpLocks/>
+            <a:stCxn id="8" idx="1"/>
+            <a:endCxn id="32" idx="0"/>
+          </p:cNvCxnSpPr>
+          <p:nvPr/>
+        </p:nvCxnSpPr>
+        <p:spPr>
+          <a:xfrm rot="10800000">
+            <a:off x="908919" y="2356038"/>
+            <a:ext cx="1229716" cy="19301"/>
+          </a:xfrm>
+          <a:prstGeom prst="curvedConnector4">
+            <a:avLst>
+              <a:gd name="adj1" fmla="val 22196"/>
+              <a:gd name="adj2" fmla="val 1284395"/>
+            </a:avLst>
+          </a:prstGeom>
+          <a:ln>
+            <a:tailEnd type="triangle"/>
+          </a:ln>
+        </p:spPr>
+        <p:style>
+          <a:lnRef idx="1">
+            <a:schemeClr val="accent1"/>
+          </a:lnRef>
+          <a:fillRef idx="0">
+            <a:schemeClr val="accent1"/>
+          </a:fillRef>
+          <a:effectRef idx="0">
+            <a:schemeClr val="accent1"/>
+          </a:effectRef>
+          <a:fontRef idx="minor">
+            <a:schemeClr val="tx1"/>
+          </a:fontRef>
+        </p:style>
+      </p:cxnSp>
+    </p:spTree>
+    <p:extLst>
+      <p:ext uri="{BB962C8B-B14F-4D97-AF65-F5344CB8AC3E}">
+        <p14:creationId xmlns:p14="http://schemas.microsoft.com/office/powerpoint/2010/main" val="1893222255"/>
+      </p:ext>
+    </p:extLst>
+  </p:cSld>
+  <p:clrMapOvr>
+    <a:masterClrMapping/>
+  </p:clrMapOvr>
+</p:sld>
+</file>
+
 <file path=ppt/theme/theme1.xml><?xml version="1.0" encoding="utf-8"?>
 <a:theme xmlns:a="http://schemas.openxmlformats.org/drawingml/2006/main" name="Office Theme">
   <a:themeElements>

</xml_diff>